<commit_message>
WEEK 2 yêu cầu
</commit_message>
<xml_diff>
--- a/WEEK_2/Slide/Day4_JC2.pptx
+++ b/WEEK_2/Slide/Day4_JC2.pptx
@@ -5,18 +5,17 @@
     <p:sldMasterId id="2147483792" r:id="rId1"/>
   </p:sldMasterIdLst>
   <p:notesMasterIdLst>
-    <p:notesMasterId r:id="rId8"/>
+    <p:notesMasterId r:id="rId7"/>
   </p:notesMasterIdLst>
   <p:handoutMasterIdLst>
-    <p:handoutMasterId r:id="rId9"/>
+    <p:handoutMasterId r:id="rId8"/>
   </p:handoutMasterIdLst>
   <p:sldIdLst>
     <p:sldId id="256" r:id="rId2"/>
     <p:sldId id="268" r:id="rId3"/>
     <p:sldId id="266" r:id="rId4"/>
     <p:sldId id="267" r:id="rId5"/>
-    <p:sldId id="269" r:id="rId6"/>
-    <p:sldId id="265" r:id="rId7"/>
+    <p:sldId id="265" r:id="rId6"/>
   </p:sldIdLst>
   <p:sldSz cx="9144000" cy="6858000" type="screen4x3"/>
   <p:notesSz cx="6858000" cy="9144000"/>
@@ -117,7 +116,7 @@
   </p:defaultTextStyle>
   <p:extLst>
     <p:ext uri="{EFAFB233-063F-42B5-8137-9DF3F51BA10A}">
-      <p15:sldGuideLst xmlns="" xmlns:p15="http://schemas.microsoft.com/office/powerpoint/2012/main">
+      <p15:sldGuideLst xmlns:p15="http://schemas.microsoft.com/office/powerpoint/2012/main" xmlns="">
         <p15:guide id="1" orient="horz" pos="2160">
           <p15:clr>
             <a:srgbClr val="A4A3A4"/>
@@ -220,7 +219,7 @@
           <a:p>
             <a:fld id="{EC3A7911-4DAA-48EB-A45A-DE2C705650C4}" type="datetimeFigureOut">
               <a:rPr lang="en-US" smtClean="0"/>
-              <a:t>10/24/15</a:t>
+              <a:t>10/30/15</a:t>
             </a:fld>
             <a:endParaRPr lang="en-US"/>
           </a:p>
@@ -390,7 +389,7 @@
           <a:p>
             <a:fld id="{9C0CF039-6D26-47FE-AF91-70176E9324FB}" type="datetimeFigureOut">
               <a:rPr lang="en-US" smtClean="0"/>
-              <a:t>10/24/15</a:t>
+              <a:t>10/30/15</a:t>
             </a:fld>
             <a:endParaRPr lang="en-US"/>
           </a:p>
@@ -938,7 +937,7 @@
           <a:p>
             <a:fld id="{7BD30864-223D-40DE-A424-4F98495464E9}" type="slidenum">
               <a:rPr lang="en-US" smtClean="0"/>
-              <a:t>6</a:t>
+              <a:t>5</a:t>
             </a:fld>
             <a:endParaRPr lang="en-US"/>
           </a:p>
@@ -3737,7 +3736,7 @@
           <a:p>
             <a:fld id="{5A661C0E-4A5F-49CF-8983-6316D061B77F}" type="datetime4">
               <a:rPr lang="en-US" smtClean="0"/>
-              <a:t>October 24, 2015</a:t>
+              <a:t>October 30, 2015</a:t>
             </a:fld>
             <a:endParaRPr lang="en-US" dirty="0"/>
           </a:p>
@@ -4027,7 +4026,7 @@
           <a:p>
             <a:fld id="{8308B6AB-402F-48F4-9A19-1CF226326041}" type="datetime4">
               <a:rPr lang="en-US" smtClean="0"/>
-              <a:t>October 24, 2015</a:t>
+              <a:t>October 30, 2015</a:t>
             </a:fld>
             <a:endParaRPr lang="en-US"/>
           </a:p>
@@ -4207,7 +4206,7 @@
           <a:p>
             <a:fld id="{EE429039-EDF2-4CBE-9967-C70B0B3F8864}" type="datetime4">
               <a:rPr lang="en-US" smtClean="0"/>
-              <a:t>October 24, 2015</a:t>
+              <a:t>October 30, 2015</a:t>
             </a:fld>
             <a:endParaRPr lang="en-US"/>
           </a:p>
@@ -4377,7 +4376,7 @@
           <a:p>
             <a:fld id="{27ADD457-7703-4556-9F8A-848647488F90}" type="datetime4">
               <a:rPr lang="en-US" smtClean="0"/>
-              <a:t>October 24, 2015</a:t>
+              <a:t>October 30, 2015</a:t>
             </a:fld>
             <a:endParaRPr lang="en-US"/>
           </a:p>
@@ -4623,7 +4622,7 @@
           <a:p>
             <a:fld id="{D0C06EE5-A6EA-4B7F-9B76-8D6BE2252FD1}" type="datetime4">
               <a:rPr lang="en-US" smtClean="0"/>
-              <a:t>October 24, 2015</a:t>
+              <a:t>October 30, 2015</a:t>
             </a:fld>
             <a:endParaRPr lang="en-US"/>
           </a:p>
@@ -4741,7 +4740,7 @@
           <a:p>
             <a:fld id="{78D8358F-69EE-4355-9D34-808F363EFC27}" type="datetime4">
               <a:rPr lang="en-US" smtClean="0"/>
-              <a:t>October 24, 2015</a:t>
+              <a:t>October 30, 2015</a:t>
             </a:fld>
             <a:endParaRPr lang="en-US"/>
           </a:p>
@@ -5285,7 +5284,7 @@
           <a:p>
             <a:fld id="{6708BAA3-5822-45E3-960E-860173D7D56D}" type="datetime4">
               <a:rPr lang="en-US" smtClean="0"/>
-              <a:t>October 24, 2015</a:t>
+              <a:t>October 30, 2015</a:t>
             </a:fld>
             <a:endParaRPr lang="en-US"/>
           </a:p>
@@ -5403,7 +5402,7 @@
           <a:p>
             <a:fld id="{C4571F8A-ED68-4966-A3D4-7EE21E0FEFB4}" type="datetime4">
               <a:rPr lang="en-US" smtClean="0"/>
-              <a:t>October 24, 2015</a:t>
+              <a:t>October 30, 2015</a:t>
             </a:fld>
             <a:endParaRPr lang="en-US"/>
           </a:p>
@@ -5498,7 +5497,7 @@
           <a:p>
             <a:fld id="{74BD9678-3DE9-453C-AD0D-A96FC67B6F39}" type="datetime4">
               <a:rPr lang="en-US" smtClean="0"/>
-              <a:t>October 24, 2015</a:t>
+              <a:t>October 30, 2015</a:t>
             </a:fld>
             <a:endParaRPr lang="en-US"/>
           </a:p>
@@ -8154,7 +8153,7 @@
           <a:p>
             <a:fld id="{CACC7E41-89A7-46A0-A483-824281376F4D}" type="datetime4">
               <a:rPr lang="en-US" smtClean="0"/>
-              <a:t>October 24, 2015</a:t>
+              <a:t>October 30, 2015</a:t>
             </a:fld>
             <a:endParaRPr lang="en-US"/>
           </a:p>
@@ -11371,7 +11370,7 @@
           <a:p>
             <a:fld id="{95FD6BB2-5CC6-4990-ABBC-E24B875979A0}" type="datetime4">
               <a:rPr lang="en-US" smtClean="0"/>
-              <a:t>October 24, 2015</a:t>
+              <a:t>October 30, 2015</a:t>
             </a:fld>
             <a:endParaRPr lang="en-US"/>
           </a:p>
@@ -14198,7 +14197,7 @@
           <a:p>
             <a:fld id="{502436A0-F3FD-4F63-B719-DA3F132809DB}" type="datetime4">
               <a:rPr lang="en-US" smtClean="0"/>
-              <a:t>October 24, 2015</a:t>
+              <a:t>October 30, 2015</a:t>
             </a:fld>
             <a:endParaRPr lang="en-US"/>
           </a:p>
@@ -14680,16 +14679,17 @@
           <a:lstStyle/>
           <a:p>
             <a:r>
+              <a:rPr lang="en-US" dirty="0" smtClean="0"/>
+              <a:t>I</a:t>
+            </a:r>
+            <a:r>
+              <a:rPr lang="en-US" dirty="0" smtClean="0"/>
+              <a:t>nput </a:t>
+            </a:r>
+            <a:r>
               <a:rPr lang="en-US" dirty="0"/>
-              <a:t>Exceptions and Assertions </a:t>
-            </a:r>
-            <a:r>
-              <a:rPr lang="en-US" dirty="0"/>
-              <a:t/>
-            </a:r>
-            <a:br>
-              <a:rPr lang="en-US" dirty="0"/>
-            </a:br>
+              <a:t>and Output in Java </a:t>
+            </a:r>
             <a:endParaRPr lang="en-US" dirty="0"/>
           </a:p>
         </p:txBody>
@@ -14808,7 +14808,6 @@
               <a:rPr lang="en-US" dirty="0"/>
               <a:t>Exceptions and Assertions </a:t>
             </a:r>
-            <a:endParaRPr lang="en-US" dirty="0"/>
           </a:p>
         </p:txBody>
       </p:sp>
@@ -14830,149 +14829,168 @@
           <a:lstStyle/>
           <a:p>
             <a:r>
+              <a:rPr lang="fi-FI" dirty="0"/>
+              <a:t>1. </a:t>
+            </a:r>
+            <a:r>
+              <a:rPr lang="fi-FI" dirty="0" err="1"/>
+              <a:t>Handling</a:t>
+            </a:r>
+            <a:r>
+              <a:rPr lang="fi-FI" dirty="0"/>
+              <a:t> </a:t>
+            </a:r>
+            <a:r>
+              <a:rPr lang="fi-FI" dirty="0" err="1"/>
+              <a:t>Files</a:t>
+            </a:r>
+            <a:r>
+              <a:rPr lang="fi-FI" dirty="0"/>
+              <a:t> in </a:t>
+            </a:r>
+            <a:r>
+              <a:rPr lang="fi-FI" dirty="0" err="1"/>
+              <a:t>java</a:t>
+            </a:r>
+            <a:endParaRPr lang="fi-FI" dirty="0"/>
+          </a:p>
+          <a:p>
+            <a:pPr lvl="1"/>
+            <a:r>
+              <a:rPr lang="en-US" dirty="0" smtClean="0"/>
+              <a:t>Understanding </a:t>
+            </a:r>
+            <a:r>
               <a:rPr lang="en-US" dirty="0"/>
-              <a:t>1. </a:t>
-            </a:r>
-            <a:r>
-              <a:rPr lang="en-US" b="1" dirty="0"/>
-              <a:t>Understanding Exceptions in Java </a:t>
+              <a:t>the file class</a:t>
+            </a:r>
+          </a:p>
+          <a:p>
+            <a:pPr lvl="1"/>
+            <a:r>
+              <a:rPr lang="en-US" dirty="0" smtClean="0"/>
+              <a:t>Navigating </a:t>
+            </a:r>
+            <a:r>
+              <a:rPr lang="en-US" dirty="0"/>
+              <a:t>the File System</a:t>
+            </a:r>
+          </a:p>
+          <a:p>
+            <a:r>
+              <a:rPr lang="sv-SE" dirty="0"/>
+              <a:t>2. </a:t>
+            </a:r>
+            <a:r>
+              <a:rPr lang="sv-SE" dirty="0" err="1"/>
+              <a:t>Understanding</a:t>
+            </a:r>
+            <a:r>
+              <a:rPr lang="sv-SE" dirty="0"/>
+              <a:t> </a:t>
+            </a:r>
+            <a:r>
+              <a:rPr lang="sv-SE" dirty="0" err="1"/>
+              <a:t>Streams</a:t>
+            </a:r>
+            <a:endParaRPr lang="sv-SE" dirty="0"/>
+          </a:p>
+          <a:p>
+            <a:pPr lvl="1"/>
+            <a:r>
+              <a:rPr lang="en-US" dirty="0" smtClean="0"/>
+              <a:t>The </a:t>
+            </a:r>
+            <a:r>
+              <a:rPr lang="en-US" dirty="0"/>
+              <a:t>Low-Level Streams</a:t>
+            </a:r>
+          </a:p>
+          <a:p>
+            <a:pPr lvl="1"/>
+            <a:r>
+              <a:rPr lang="en-US" dirty="0" smtClean="0"/>
+              <a:t>The </a:t>
+            </a:r>
+            <a:r>
+              <a:rPr lang="en-US" dirty="0"/>
+              <a:t>High-Level Streams</a:t>
+            </a:r>
+          </a:p>
+          <a:p>
+            <a:r>
+              <a:rPr lang="en-US" dirty="0"/>
+              <a:t>3. Readers and Writers</a:t>
+            </a:r>
+          </a:p>
+          <a:p>
+            <a:pPr lvl="1"/>
+            <a:r>
+              <a:rPr lang="en-US" dirty="0" smtClean="0"/>
+              <a:t>Low</a:t>
+            </a:r>
+            <a:r>
+              <a:rPr lang="en-US" dirty="0"/>
+              <a:t>-Level Readers and Writers</a:t>
+            </a:r>
+          </a:p>
+          <a:p>
+            <a:pPr lvl="1"/>
+            <a:r>
+              <a:rPr lang="en-US" dirty="0" smtClean="0"/>
+              <a:t>High</a:t>
+            </a:r>
+            <a:r>
+              <a:rPr lang="en-US" dirty="0"/>
+              <a:t>-Level Readers and Writers</a:t>
+            </a:r>
+          </a:p>
+          <a:p>
+            <a:r>
+              <a:rPr lang="en-US" dirty="0"/>
+              <a:t>4. Exceptions During I/O </a:t>
+            </a:r>
+            <a:r>
+              <a:rPr lang="en-US" dirty="0" err="1"/>
+              <a:t>Perations</a:t>
+            </a:r>
+            <a:endParaRPr lang="en-US" dirty="0"/>
+          </a:p>
+          <a:p>
+            <a:r>
+              <a:rPr lang="en-US" dirty="0"/>
+              <a:t>5. Object Streams and Serialization</a:t>
+            </a:r>
+          </a:p>
+          <a:p>
+            <a:pPr lvl="1"/>
+            <a:r>
+              <a:rPr lang="en-US" dirty="0" smtClean="0"/>
+              <a:t>Writing </a:t>
+            </a:r>
+            <a:r>
+              <a:rPr lang="en-US" dirty="0"/>
+              <a:t>with </a:t>
+            </a:r>
+            <a:r>
+              <a:rPr lang="en-US" dirty="0" err="1"/>
+              <a:t>ObjectOutputStream</a:t>
             </a:r>
             <a:endParaRPr lang="en-US" dirty="0"/>
           </a:p>
           <a:p>
             <a:pPr lvl="1"/>
             <a:r>
-              <a:rPr lang="en-US" b="1" dirty="0" smtClean="0"/>
-              <a:t>The </a:t>
-            </a:r>
-            <a:r>
-              <a:rPr lang="en-US" b="1" dirty="0"/>
-              <a:t>Exception Tree in Java </a:t>
-            </a:r>
-            <a:endParaRPr lang="en-US" dirty="0"/>
-          </a:p>
-          <a:p>
-            <a:pPr lvl="1"/>
-            <a:r>
-              <a:rPr lang="en-US" b="1" dirty="0" smtClean="0"/>
-              <a:t>Checked </a:t>
-            </a:r>
-            <a:r>
-              <a:rPr lang="en-US" b="1" dirty="0"/>
-              <a:t>Exceptions and Runtime </a:t>
-            </a:r>
-            <a:r>
-              <a:rPr lang="en-US" b="1" dirty="0" smtClean="0"/>
-              <a:t>Exceptions</a:t>
-            </a:r>
-            <a:endParaRPr lang="en-US" dirty="0"/>
-          </a:p>
-          <a:p>
-            <a:pPr lvl="1"/>
-            <a:r>
-              <a:rPr lang="en-US" b="1" dirty="0" smtClean="0"/>
-              <a:t>Standard </a:t>
-            </a:r>
-            <a:r>
-              <a:rPr lang="en-US" b="1" dirty="0"/>
-              <a:t>Exceptions </a:t>
-            </a:r>
-            <a:endParaRPr lang="en-US" dirty="0"/>
-          </a:p>
-          <a:p>
+              <a:rPr lang="en-US" dirty="0" smtClean="0"/>
+              <a:t>Reading </a:t>
+            </a:r>
             <a:r>
               <a:rPr lang="en-US" dirty="0"/>
-              <a:t>2</a:t>
-            </a:r>
-            <a:r>
-              <a:rPr lang="en-US" dirty="0" smtClean="0"/>
-              <a:t>. </a:t>
-            </a:r>
-            <a:r>
-              <a:rPr lang="en-US" b="1" dirty="0"/>
-              <a:t>Basics of Exception Handling </a:t>
-            </a:r>
-            <a:endParaRPr lang="en-US" b="1" dirty="0" smtClean="0"/>
-          </a:p>
-          <a:p>
-            <a:pPr lvl="1"/>
-            <a:r>
-              <a:rPr lang="en-US" b="1" dirty="0"/>
-              <a:t>Using the try and catch Blocks </a:t>
-            </a:r>
-            <a:endParaRPr lang="en-US" dirty="0"/>
-          </a:p>
-          <a:p>
-            <a:pPr lvl="1"/>
-            <a:r>
-              <a:rPr lang="en-US" b="1" dirty="0"/>
-              <a:t>Using the finally Block </a:t>
-            </a:r>
-            <a:endParaRPr lang="en-US" dirty="0"/>
-          </a:p>
-          <a:p>
-            <a:pPr lvl="1"/>
-            <a:r>
-              <a:rPr lang="en-US" b="1" dirty="0"/>
-              <a:t>Using Multiple catch Blocks </a:t>
-            </a:r>
-            <a:endParaRPr lang="en-US" dirty="0" smtClean="0"/>
-          </a:p>
-          <a:p>
-            <a:r>
-              <a:rPr lang="en-US" b="1" dirty="0" smtClean="0"/>
-              <a:t>3. Throwing Exceptions</a:t>
-            </a:r>
-          </a:p>
-          <a:p>
-            <a:r>
-              <a:rPr lang="en-US" b="1" dirty="0" smtClean="0"/>
-              <a:t>4. Control </a:t>
-            </a:r>
-            <a:r>
-              <a:rPr lang="en-US" b="1" dirty="0"/>
-              <a:t>Flow in Exception </a:t>
-            </a:r>
-            <a:r>
-              <a:rPr lang="en-US" b="1" dirty="0" smtClean="0"/>
-              <a:t>Condition</a:t>
-            </a:r>
-          </a:p>
-          <a:p>
-            <a:r>
-              <a:rPr lang="en-US" b="1" dirty="0" smtClean="0"/>
-              <a:t>5. </a:t>
-            </a:r>
-            <a:r>
-              <a:rPr lang="en-US" b="1" dirty="0"/>
-              <a:t>Declaring Exceptions </a:t>
-            </a:r>
-            <a:endParaRPr lang="en-US" dirty="0"/>
-          </a:p>
-          <a:p>
-            <a:pPr lvl="1"/>
-            <a:r>
-              <a:rPr lang="en-US" b="1" dirty="0"/>
-              <a:t>Checked Exception: Duck It or Catch It </a:t>
-            </a:r>
-            <a:endParaRPr lang="en-US" dirty="0"/>
-          </a:p>
-          <a:p>
-            <a:pPr lvl="1"/>
-            <a:r>
-              <a:rPr lang="en-US" b="1" dirty="0" smtClean="0"/>
-              <a:t> </a:t>
-            </a:r>
-            <a:r>
-              <a:rPr lang="en-US" b="1" dirty="0"/>
-              <a:t>Declaring Exceptions when Overriding </a:t>
-            </a:r>
-            <a:endParaRPr lang="en-US" dirty="0" smtClean="0"/>
-          </a:p>
-          <a:p>
-            <a:r>
-              <a:rPr lang="en-US" b="1" dirty="0" smtClean="0"/>
-              <a:t>6. Assertions</a:t>
+              <a:t>with </a:t>
+            </a:r>
+            <a:r>
+              <a:rPr lang="en-US" dirty="0" err="1"/>
+              <a:t>ObjectInputStream</a:t>
             </a:r>
             <a:endParaRPr lang="en-US" dirty="0"/>
           </a:p>
@@ -15114,7 +15132,15 @@
             </a:r>
             <a:r>
               <a:rPr lang="vi-VN" dirty="0" smtClean="0"/>
-              <a:t>Đào Hiệp, Quang Thuần</a:t>
+              <a:t>Đào Hiệp</a:t>
+            </a:r>
+            <a:r>
+              <a:rPr lang="vi-VN" dirty="0" smtClean="0"/>
+              <a:t>, </a:t>
+            </a:r>
+            <a:r>
+              <a:rPr lang="vi-VN" dirty="0" smtClean="0"/>
+              <a:t>Tôn Thuận</a:t>
             </a:r>
             <a:r>
               <a:rPr lang="vi-VN" dirty="0"/>
@@ -15129,15 +15155,7 @@
             </a:r>
             <a:r>
               <a:rPr lang="vi-VN" dirty="0" smtClean="0"/>
-              <a:t>Đinh Trọng Tuyên</a:t>
-            </a:r>
-            <a:r>
-              <a:rPr lang="vi-VN" dirty="0" smtClean="0"/>
-              <a:t> , </a:t>
-            </a:r>
-            <a:r>
-              <a:rPr lang="vi-VN" dirty="0" smtClean="0"/>
-              <a:t>Vũ Công Luận </a:t>
+              <a:t>Đinh Trọng Tuyên , Vũ Công Luận </a:t>
             </a:r>
             <a:r>
               <a:rPr lang="vi-VN" dirty="0"/>
@@ -15152,7 +15170,11 @@
             </a:r>
             <a:r>
               <a:rPr lang="vi-VN" dirty="0" smtClean="0"/>
-              <a:t>Thành Đạt, Thành</a:t>
+              <a:t>Thành Đạt, </a:t>
+            </a:r>
+            <a:r>
+              <a:rPr lang="vi-VN" dirty="0" smtClean="0"/>
+              <a:t>Thái</a:t>
             </a:r>
             <a:endParaRPr lang="en-US" dirty="0"/>
           </a:p>
@@ -15278,8 +15300,70 @@
               <a:t> 1: </a:t>
             </a:r>
             <a:r>
-              <a:rPr lang="en-US" sz="1600" b="1" dirty="0"/>
-              <a:t>Understanding Exceptions in Java </a:t>
+              <a:rPr lang="fi-FI" sz="1600" dirty="0" err="1"/>
+              <a:t>Handling</a:t>
+            </a:r>
+            <a:r>
+              <a:rPr lang="fi-FI" sz="1600" dirty="0"/>
+              <a:t> </a:t>
+            </a:r>
+            <a:r>
+              <a:rPr lang="fi-FI" sz="1600" dirty="0" err="1"/>
+              <a:t>Files</a:t>
+            </a:r>
+            <a:r>
+              <a:rPr lang="fi-FI" sz="1600" dirty="0"/>
+              <a:t> in </a:t>
+            </a:r>
+            <a:r>
+              <a:rPr lang="fi-FI" sz="1600" dirty="0" err="1"/>
+              <a:t>java</a:t>
+            </a:r>
+            <a:r>
+              <a:rPr lang="en-US" sz="1600" b="1" dirty="0" smtClean="0"/>
+              <a:t> </a:t>
+            </a:r>
+            <a:endParaRPr lang="en-US" sz="1600" dirty="0" smtClean="0"/>
+          </a:p>
+          <a:p>
+            <a:r>
+              <a:rPr lang="en-US" sz="1600" dirty="0" err="1" smtClean="0"/>
+              <a:t>Nhóm</a:t>
+            </a:r>
+            <a:r>
+              <a:rPr lang="en-US" sz="1600" dirty="0" smtClean="0"/>
+              <a:t> 2: </a:t>
+            </a:r>
+            <a:r>
+              <a:rPr lang="sv-SE" sz="1600" dirty="0" err="1"/>
+              <a:t>Understanding</a:t>
+            </a:r>
+            <a:r>
+              <a:rPr lang="sv-SE" sz="1600" dirty="0"/>
+              <a:t> </a:t>
+            </a:r>
+            <a:r>
+              <a:rPr lang="sv-SE" sz="1600" dirty="0" err="1"/>
+              <a:t>Streams</a:t>
+            </a:r>
+            <a:endParaRPr lang="en-US" sz="1600" dirty="0" smtClean="0"/>
+          </a:p>
+          <a:p>
+            <a:r>
+              <a:rPr lang="en-US" sz="1600" dirty="0" err="1" smtClean="0"/>
+              <a:t>Nhóm</a:t>
+            </a:r>
+            <a:r>
+              <a:rPr lang="en-US" sz="1600" dirty="0" smtClean="0"/>
+              <a:t> </a:t>
+            </a:r>
+            <a:r>
+              <a:rPr lang="en-US" sz="1600" dirty="0"/>
+              <a:t>3: </a:t>
+            </a:r>
+            <a:r>
+              <a:rPr lang="en-US" sz="1600" dirty="0"/>
+              <a:t>Low-Level Readers and Writers</a:t>
             </a:r>
             <a:endParaRPr lang="en-US" sz="1600" dirty="0"/>
           </a:p>
@@ -15290,11 +15374,11 @@
             </a:r>
             <a:r>
               <a:rPr lang="en-US" sz="1600" dirty="0"/>
-              <a:t> 2: </a:t>
-            </a:r>
-            <a:r>
-              <a:rPr lang="en-US" sz="1600" b="1" dirty="0"/>
-              <a:t>Basics of Exception Handling</a:t>
+              <a:t> 4: </a:t>
+            </a:r>
+            <a:r>
+              <a:rPr lang="en-US" sz="1600" dirty="0"/>
+              <a:t>High-Level Readers and Writers</a:t>
             </a:r>
             <a:endParaRPr lang="en-US" sz="1600" dirty="0"/>
           </a:p>
@@ -15305,36 +15389,6 @@
             </a:r>
             <a:r>
               <a:rPr lang="en-US" sz="1600" dirty="0"/>
-              <a:t> 3: </a:t>
-            </a:r>
-            <a:r>
-              <a:rPr lang="en-US" sz="1600" b="1" dirty="0"/>
-              <a:t>Throwing Exceptions</a:t>
-            </a:r>
-            <a:endParaRPr lang="en-US" sz="1600" dirty="0"/>
-          </a:p>
-          <a:p>
-            <a:r>
-              <a:rPr lang="en-US" sz="1600" dirty="0" err="1"/>
-              <a:t>Nhóm</a:t>
-            </a:r>
-            <a:r>
-              <a:rPr lang="en-US" sz="1600" dirty="0"/>
-              <a:t> 4: </a:t>
-            </a:r>
-            <a:r>
-              <a:rPr lang="en-US" sz="1600" b="1" dirty="0"/>
-              <a:t>Control Flow in Exception Condition</a:t>
-            </a:r>
-            <a:endParaRPr lang="en-US" sz="1600" dirty="0"/>
-          </a:p>
-          <a:p>
-            <a:r>
-              <a:rPr lang="en-US" sz="1600" dirty="0" err="1"/>
-              <a:t>Nhóm</a:t>
-            </a:r>
-            <a:r>
-              <a:rPr lang="en-US" sz="1600" dirty="0"/>
               <a:t> 5</a:t>
             </a:r>
             <a:r>
@@ -15342,16 +15396,20 @@
               <a:t>:</a:t>
             </a:r>
             <a:r>
-              <a:rPr lang="en-US" sz="1600" b="1" dirty="0"/>
-              <a:t>Declaring </a:t>
-            </a:r>
-            <a:r>
-              <a:rPr lang="en-US" sz="1600" b="1" dirty="0" smtClean="0"/>
-              <a:t>Exceptions &amp; </a:t>
-            </a:r>
-            <a:r>
-              <a:rPr lang="en-US" sz="1600" b="1" dirty="0"/>
-              <a:t>Assertions</a:t>
+              <a:rPr lang="en-US" sz="1600" dirty="0"/>
+              <a:t>Exceptions During I/O </a:t>
+            </a:r>
+            <a:r>
+              <a:rPr lang="en-US" sz="1600" dirty="0" err="1" smtClean="0"/>
+              <a:t>Perations</a:t>
+            </a:r>
+            <a:r>
+              <a:rPr lang="en-US" sz="1600" dirty="0" smtClean="0"/>
+              <a:t> &amp; </a:t>
+            </a:r>
+            <a:r>
+              <a:rPr lang="en-US" sz="1600" dirty="0"/>
+              <a:t>Object Streams and Serialization</a:t>
             </a:r>
             <a:endParaRPr lang="en-US" sz="1600" dirty="0"/>
           </a:p>
@@ -16585,615 +16643,6 @@
 </file>
 
 <file path=ppt/slides/slide5.xml><?xml version="1.0" encoding="utf-8"?>
-<p:sld xmlns:a="http://schemas.openxmlformats.org/drawingml/2006/main" xmlns:r="http://schemas.openxmlformats.org/officeDocument/2006/relationships" xmlns:p="http://schemas.openxmlformats.org/presentationml/2006/main">
-  <p:cSld>
-    <p:spTree>
-      <p:nvGrpSpPr>
-        <p:cNvPr id="1" name=""/>
-        <p:cNvGrpSpPr/>
-        <p:nvPr/>
-      </p:nvGrpSpPr>
-      <p:grpSpPr>
-        <a:xfrm>
-          <a:off x="0" y="0"/>
-          <a:ext cx="0" cy="0"/>
-          <a:chOff x="0" y="0"/>
-          <a:chExt cx="0" cy="0"/>
-        </a:xfrm>
-      </p:grpSpPr>
-      <p:sp>
-        <p:nvSpPr>
-          <p:cNvPr id="2" name="Title 1"/>
-          <p:cNvSpPr>
-            <a:spLocks noGrp="1"/>
-          </p:cNvSpPr>
-          <p:nvPr>
-            <p:ph type="title"/>
-          </p:nvPr>
-        </p:nvSpPr>
-        <p:spPr/>
-        <p:txBody>
-          <a:bodyPr/>
-          <a:lstStyle/>
-          <a:p>
-            <a:r>
-              <a:rPr lang="en-US" dirty="0" err="1" smtClean="0"/>
-              <a:t>Bài</a:t>
-            </a:r>
-            <a:r>
-              <a:rPr lang="en-US" dirty="0" smtClean="0"/>
-              <a:t> </a:t>
-            </a:r>
-            <a:r>
-              <a:rPr lang="en-US" dirty="0" err="1" smtClean="0"/>
-              <a:t>tập</a:t>
-            </a:r>
-            <a:endParaRPr lang="en-US" dirty="0"/>
-          </a:p>
-        </p:txBody>
-      </p:sp>
-      <p:sp>
-        <p:nvSpPr>
-          <p:cNvPr id="3" name="Content Placeholder 2"/>
-          <p:cNvSpPr>
-            <a:spLocks noGrp="1"/>
-          </p:cNvSpPr>
-          <p:nvPr>
-            <p:ph idx="1"/>
-          </p:nvPr>
-        </p:nvSpPr>
-        <p:spPr/>
-        <p:txBody>
-          <a:bodyPr/>
-          <a:lstStyle/>
-          <a:p>
-            <a:r>
-              <a:rPr lang="en-US" dirty="0" err="1" smtClean="0"/>
-              <a:t>Viết</a:t>
-            </a:r>
-            <a:r>
-              <a:rPr lang="en-US" dirty="0" smtClean="0"/>
-              <a:t> </a:t>
-            </a:r>
-            <a:r>
-              <a:rPr lang="en-US" dirty="0" err="1" smtClean="0"/>
-              <a:t>lớp</a:t>
-            </a:r>
-            <a:r>
-              <a:rPr lang="en-US" dirty="0" smtClean="0"/>
-              <a:t> </a:t>
-            </a:r>
-            <a:r>
-              <a:rPr lang="en-US" dirty="0" err="1" smtClean="0"/>
-              <a:t>MyException</a:t>
-            </a:r>
-            <a:r>
-              <a:rPr lang="en-US" dirty="0" smtClean="0"/>
-              <a:t> extent </a:t>
-            </a:r>
-            <a:r>
-              <a:rPr lang="en-US" dirty="0" err="1" smtClean="0"/>
-              <a:t>từ</a:t>
-            </a:r>
-            <a:r>
-              <a:rPr lang="en-US" dirty="0" smtClean="0"/>
-              <a:t> </a:t>
-            </a:r>
-            <a:r>
-              <a:rPr lang="en-US" dirty="0" err="1" smtClean="0"/>
-              <a:t>lớp</a:t>
-            </a:r>
-            <a:r>
-              <a:rPr lang="en-US" dirty="0" smtClean="0"/>
-              <a:t> Exception. </a:t>
-            </a:r>
-            <a:r>
-              <a:rPr lang="en-US" dirty="0" err="1" smtClean="0"/>
-              <a:t>Với</a:t>
-            </a:r>
-            <a:r>
-              <a:rPr lang="en-US" dirty="0" smtClean="0"/>
-              <a:t> </a:t>
-            </a:r>
-            <a:r>
-              <a:rPr lang="en-US" dirty="0" err="1" smtClean="0"/>
-              <a:t>cấu</a:t>
-            </a:r>
-            <a:r>
-              <a:rPr lang="en-US" dirty="0" smtClean="0"/>
-              <a:t> </a:t>
-            </a:r>
-            <a:r>
-              <a:rPr lang="en-US" dirty="0" err="1" smtClean="0"/>
-              <a:t>hàm</a:t>
-            </a:r>
-            <a:r>
-              <a:rPr lang="en-US" dirty="0" smtClean="0"/>
-              <a:t> </a:t>
-            </a:r>
-            <a:r>
-              <a:rPr lang="en-US" dirty="0" err="1" smtClean="0"/>
-              <a:t>khởi</a:t>
-            </a:r>
-            <a:r>
-              <a:rPr lang="en-US" dirty="0" smtClean="0"/>
-              <a:t> </a:t>
-            </a:r>
-            <a:r>
-              <a:rPr lang="en-US" dirty="0" err="1" smtClean="0"/>
-              <a:t>tạo</a:t>
-            </a:r>
-            <a:r>
-              <a:rPr lang="en-US" dirty="0" smtClean="0"/>
-              <a:t> </a:t>
-            </a:r>
-            <a:r>
-              <a:rPr lang="en-US" dirty="0" err="1" smtClean="0"/>
-              <a:t>là</a:t>
-            </a:r>
-            <a:r>
-              <a:rPr lang="en-US" dirty="0" smtClean="0"/>
-              <a:t> </a:t>
-            </a:r>
-            <a:r>
-              <a:rPr lang="en-US" dirty="0" err="1" smtClean="0"/>
-              <a:t>chuỗi</a:t>
-            </a:r>
-            <a:r>
-              <a:rPr lang="en-US" dirty="0" smtClean="0"/>
-              <a:t> String </a:t>
-            </a:r>
-            <a:r>
-              <a:rPr lang="en-US" dirty="0" err="1" smtClean="0"/>
-              <a:t>miêu</a:t>
-            </a:r>
-            <a:r>
-              <a:rPr lang="en-US" dirty="0" smtClean="0"/>
-              <a:t> </a:t>
-            </a:r>
-            <a:r>
-              <a:rPr lang="en-US" dirty="0" err="1" smtClean="0"/>
-              <a:t>tả</a:t>
-            </a:r>
-            <a:r>
-              <a:rPr lang="en-US" dirty="0" smtClean="0"/>
-              <a:t> </a:t>
-            </a:r>
-            <a:r>
-              <a:rPr lang="en-US" dirty="0" err="1" smtClean="0"/>
-              <a:t>về</a:t>
-            </a:r>
-            <a:r>
-              <a:rPr lang="en-US" dirty="0" smtClean="0"/>
-              <a:t> </a:t>
-            </a:r>
-            <a:r>
-              <a:rPr lang="en-US" dirty="0" err="1" smtClean="0"/>
-              <a:t>lỗi</a:t>
-            </a:r>
-            <a:r>
-              <a:rPr lang="en-US" dirty="0" smtClean="0"/>
-              <a:t>.</a:t>
-            </a:r>
-          </a:p>
-          <a:p>
-            <a:r>
-              <a:rPr lang="en-US" dirty="0" err="1" smtClean="0"/>
-              <a:t>Viết</a:t>
-            </a:r>
-            <a:r>
-              <a:rPr lang="en-US" dirty="0" smtClean="0"/>
-              <a:t> </a:t>
-            </a:r>
-            <a:r>
-              <a:rPr lang="en-US" dirty="0" err="1" smtClean="0"/>
-              <a:t>chương</a:t>
-            </a:r>
-            <a:r>
-              <a:rPr lang="en-US" dirty="0" smtClean="0"/>
-              <a:t> </a:t>
-            </a:r>
-            <a:r>
-              <a:rPr lang="en-US" dirty="0" err="1" smtClean="0"/>
-              <a:t>trình</a:t>
-            </a:r>
-            <a:r>
-              <a:rPr lang="en-US" dirty="0" smtClean="0"/>
-              <a:t> </a:t>
-            </a:r>
-            <a:r>
-              <a:rPr lang="en-US" dirty="0" err="1" smtClean="0"/>
-              <a:t>máy</a:t>
-            </a:r>
-            <a:r>
-              <a:rPr lang="en-US" dirty="0" smtClean="0"/>
-              <a:t> </a:t>
-            </a:r>
-            <a:r>
-              <a:rPr lang="en-US" dirty="0" err="1" smtClean="0"/>
-              <a:t>tính</a:t>
-            </a:r>
-            <a:r>
-              <a:rPr lang="en-US" dirty="0" smtClean="0"/>
-              <a:t>. Cho </a:t>
-            </a:r>
-            <a:r>
-              <a:rPr lang="en-US" dirty="0" err="1" smtClean="0"/>
-              <a:t>phép</a:t>
-            </a:r>
-            <a:r>
-              <a:rPr lang="en-US" dirty="0" smtClean="0"/>
-              <a:t> </a:t>
-            </a:r>
-            <a:r>
-              <a:rPr lang="en-US" dirty="0" err="1" smtClean="0"/>
-              <a:t>nhập</a:t>
-            </a:r>
-            <a:r>
-              <a:rPr lang="en-US" dirty="0" smtClean="0"/>
-              <a:t> </a:t>
-            </a:r>
-            <a:r>
-              <a:rPr lang="en-US" dirty="0" err="1" smtClean="0"/>
-              <a:t>vào</a:t>
-            </a:r>
-            <a:r>
-              <a:rPr lang="en-US" dirty="0" smtClean="0"/>
-              <a:t> 2 </a:t>
-            </a:r>
-            <a:r>
-              <a:rPr lang="en-US" dirty="0" err="1" smtClean="0"/>
-              <a:t>toán</a:t>
-            </a:r>
-            <a:r>
-              <a:rPr lang="en-US" dirty="0" smtClean="0"/>
-              <a:t> </a:t>
-            </a:r>
-            <a:r>
-              <a:rPr lang="en-US" dirty="0" err="1" smtClean="0"/>
-              <a:t>hạng</a:t>
-            </a:r>
-            <a:r>
-              <a:rPr lang="en-US" dirty="0" smtClean="0"/>
-              <a:t> </a:t>
-            </a:r>
-            <a:r>
-              <a:rPr lang="en-US" dirty="0" err="1" smtClean="0"/>
-              <a:t>từ</a:t>
-            </a:r>
-            <a:r>
-              <a:rPr lang="en-US" dirty="0" smtClean="0"/>
-              <a:t> </a:t>
-            </a:r>
-            <a:r>
-              <a:rPr lang="en-US" dirty="0" err="1" smtClean="0"/>
-              <a:t>bàn</a:t>
-            </a:r>
-            <a:r>
-              <a:rPr lang="en-US" dirty="0" smtClean="0"/>
-              <a:t> </a:t>
-            </a:r>
-            <a:r>
-              <a:rPr lang="en-US" dirty="0" err="1" smtClean="0"/>
-              <a:t>phím</a:t>
-            </a:r>
-            <a:r>
-              <a:rPr lang="en-US" dirty="0" smtClean="0"/>
-              <a:t>. </a:t>
-            </a:r>
-            <a:r>
-              <a:rPr lang="en-US" dirty="0" err="1" smtClean="0"/>
-              <a:t>Và</a:t>
-            </a:r>
-            <a:r>
-              <a:rPr lang="en-US" dirty="0" smtClean="0"/>
-              <a:t> </a:t>
-            </a:r>
-            <a:r>
-              <a:rPr lang="en-US" dirty="0" err="1" smtClean="0"/>
-              <a:t>ném</a:t>
-            </a:r>
-            <a:r>
-              <a:rPr lang="en-US" dirty="0" smtClean="0"/>
-              <a:t> </a:t>
-            </a:r>
-            <a:r>
-              <a:rPr lang="en-US" dirty="0" err="1" smtClean="0"/>
-              <a:t>ra</a:t>
-            </a:r>
-            <a:r>
-              <a:rPr lang="en-US" dirty="0" smtClean="0"/>
-              <a:t> </a:t>
-            </a:r>
-            <a:r>
-              <a:rPr lang="en-US" dirty="0" err="1" smtClean="0"/>
-              <a:t>ngoại</a:t>
-            </a:r>
-            <a:r>
-              <a:rPr lang="en-US" dirty="0" smtClean="0"/>
-              <a:t> </a:t>
-            </a:r>
-            <a:r>
-              <a:rPr lang="en-US" dirty="0" err="1" smtClean="0"/>
-              <a:t>lệ</a:t>
-            </a:r>
-            <a:r>
-              <a:rPr lang="en-US" dirty="0" smtClean="0"/>
-              <a:t> </a:t>
-            </a:r>
-            <a:r>
-              <a:rPr lang="en-US" dirty="0" err="1" smtClean="0"/>
-              <a:t>nếu</a:t>
-            </a:r>
-            <a:r>
-              <a:rPr lang="en-US" dirty="0" smtClean="0"/>
-              <a:t> </a:t>
-            </a:r>
-            <a:r>
-              <a:rPr lang="en-US" dirty="0" err="1" smtClean="0"/>
-              <a:t>bị</a:t>
-            </a:r>
-            <a:r>
-              <a:rPr lang="en-US" dirty="0" smtClean="0"/>
-              <a:t> </a:t>
-            </a:r>
-            <a:r>
-              <a:rPr lang="en-US" dirty="0" err="1" smtClean="0"/>
-              <a:t>các</a:t>
-            </a:r>
-            <a:r>
-              <a:rPr lang="en-US" dirty="0" smtClean="0"/>
-              <a:t> </a:t>
-            </a:r>
-            <a:r>
-              <a:rPr lang="en-US" dirty="0" err="1" smtClean="0"/>
-              <a:t>lỗi</a:t>
-            </a:r>
-            <a:r>
-              <a:rPr lang="en-US" dirty="0" smtClean="0"/>
-              <a:t> </a:t>
-            </a:r>
-            <a:r>
-              <a:rPr lang="en-US" dirty="0" err="1" smtClean="0"/>
-              <a:t>trong</a:t>
-            </a:r>
-            <a:r>
-              <a:rPr lang="en-US" dirty="0" smtClean="0"/>
-              <a:t> </a:t>
-            </a:r>
-            <a:r>
-              <a:rPr lang="en-US" dirty="0" err="1" smtClean="0"/>
-              <a:t>tính</a:t>
-            </a:r>
-            <a:r>
-              <a:rPr lang="en-US" dirty="0" smtClean="0"/>
-              <a:t> </a:t>
-            </a:r>
-            <a:r>
-              <a:rPr lang="en-US" dirty="0" err="1" smtClean="0"/>
-              <a:t>toán</a:t>
-            </a:r>
-            <a:r>
-              <a:rPr lang="en-US" dirty="0" smtClean="0"/>
-              <a:t> </a:t>
-            </a:r>
-            <a:r>
-              <a:rPr lang="en-US" dirty="0" err="1" smtClean="0"/>
-              <a:t>như</a:t>
-            </a:r>
-            <a:r>
-              <a:rPr lang="en-US" dirty="0" smtClean="0"/>
-              <a:t>: chia </a:t>
-            </a:r>
-            <a:r>
-              <a:rPr lang="en-US" dirty="0" err="1" smtClean="0"/>
-              <a:t>cho</a:t>
-            </a:r>
-            <a:r>
-              <a:rPr lang="en-US" dirty="0" smtClean="0"/>
-              <a:t> 0 ,… ( </a:t>
-            </a:r>
-            <a:r>
-              <a:rPr lang="en-US" dirty="0" err="1" smtClean="0"/>
-              <a:t>sử</a:t>
-            </a:r>
-            <a:r>
-              <a:rPr lang="en-US" dirty="0" smtClean="0"/>
-              <a:t> </a:t>
-            </a:r>
-            <a:r>
-              <a:rPr lang="en-US" dirty="0" err="1" smtClean="0"/>
-              <a:t>dụng</a:t>
-            </a:r>
-            <a:r>
-              <a:rPr lang="en-US" dirty="0" smtClean="0"/>
-              <a:t> </a:t>
-            </a:r>
-            <a:r>
-              <a:rPr lang="en-US" dirty="0" err="1" smtClean="0"/>
-              <a:t>lớp</a:t>
-            </a:r>
-            <a:r>
-              <a:rPr lang="en-US" dirty="0" smtClean="0"/>
-              <a:t> </a:t>
-            </a:r>
-            <a:r>
-              <a:rPr lang="en-US" dirty="0" err="1" smtClean="0"/>
-              <a:t>MyException</a:t>
-            </a:r>
-            <a:r>
-              <a:rPr lang="en-US" dirty="0" smtClean="0"/>
-              <a:t> </a:t>
-            </a:r>
-            <a:r>
-              <a:rPr lang="en-US" dirty="0" err="1" smtClean="0"/>
-              <a:t>trên</a:t>
-            </a:r>
-            <a:r>
-              <a:rPr lang="en-US" dirty="0" smtClean="0"/>
-              <a:t> </a:t>
-            </a:r>
-            <a:r>
-              <a:rPr lang="en-US" dirty="0" err="1" smtClean="0"/>
-              <a:t>để</a:t>
-            </a:r>
-            <a:r>
-              <a:rPr lang="en-US" dirty="0" smtClean="0"/>
-              <a:t> </a:t>
-            </a:r>
-            <a:r>
-              <a:rPr lang="en-US" dirty="0" err="1" smtClean="0"/>
-              <a:t>ném</a:t>
-            </a:r>
-            <a:r>
-              <a:rPr lang="en-US" dirty="0" smtClean="0"/>
-              <a:t> </a:t>
-            </a:r>
-            <a:r>
-              <a:rPr lang="en-US" dirty="0" err="1" smtClean="0"/>
-              <a:t>ra</a:t>
-            </a:r>
-            <a:r>
-              <a:rPr lang="en-US" dirty="0" smtClean="0"/>
-              <a:t>, </a:t>
-            </a:r>
-            <a:r>
-              <a:rPr lang="en-US" dirty="0" err="1" smtClean="0"/>
-              <a:t>sau</a:t>
-            </a:r>
-            <a:r>
-              <a:rPr lang="en-US" dirty="0" smtClean="0"/>
-              <a:t> </a:t>
-            </a:r>
-            <a:r>
-              <a:rPr lang="en-US" dirty="0" err="1" smtClean="0"/>
-              <a:t>đó</a:t>
-            </a:r>
-            <a:r>
-              <a:rPr lang="en-US" dirty="0" smtClean="0"/>
-              <a:t> try, catch </a:t>
-            </a:r>
-            <a:r>
-              <a:rPr lang="en-US" dirty="0" err="1" smtClean="0"/>
-              <a:t>lại</a:t>
-            </a:r>
-            <a:r>
-              <a:rPr lang="en-US" dirty="0" smtClean="0"/>
-              <a:t> </a:t>
-            </a:r>
-            <a:r>
-              <a:rPr lang="en-US" dirty="0" err="1" smtClean="0"/>
-              <a:t>cái</a:t>
-            </a:r>
-            <a:r>
-              <a:rPr lang="en-US" dirty="0" smtClean="0"/>
-              <a:t> </a:t>
-            </a:r>
-            <a:r>
-              <a:rPr lang="en-US" dirty="0" err="1" smtClean="0"/>
-              <a:t>lỗi</a:t>
-            </a:r>
-            <a:r>
-              <a:rPr lang="en-US" dirty="0" smtClean="0"/>
-              <a:t> </a:t>
-            </a:r>
-            <a:r>
-              <a:rPr lang="en-US" dirty="0" err="1" smtClean="0"/>
-              <a:t>đó</a:t>
-            </a:r>
-            <a:r>
-              <a:rPr lang="en-US" dirty="0" smtClean="0"/>
-              <a:t> </a:t>
-            </a:r>
-            <a:r>
-              <a:rPr lang="en-US" dirty="0" err="1" smtClean="0"/>
-              <a:t>và</a:t>
-            </a:r>
-            <a:r>
-              <a:rPr lang="en-US" dirty="0" smtClean="0"/>
-              <a:t> </a:t>
-            </a:r>
-            <a:r>
-              <a:rPr lang="en-US" dirty="0" err="1" smtClean="0"/>
-              <a:t>hiển</a:t>
-            </a:r>
-            <a:r>
-              <a:rPr lang="en-US" dirty="0" smtClean="0"/>
-              <a:t> </a:t>
-            </a:r>
-            <a:r>
-              <a:rPr lang="en-US" dirty="0" err="1" smtClean="0"/>
-              <a:t>thị</a:t>
-            </a:r>
-            <a:r>
-              <a:rPr lang="en-US" dirty="0" smtClean="0"/>
-              <a:t> </a:t>
-            </a:r>
-            <a:r>
-              <a:rPr lang="en-US" dirty="0" err="1" smtClean="0"/>
-              <a:t>ra</a:t>
-            </a:r>
-            <a:r>
-              <a:rPr lang="en-US" dirty="0" smtClean="0"/>
-              <a:t> </a:t>
-            </a:r>
-            <a:r>
-              <a:rPr lang="en-US" dirty="0" err="1" smtClean="0"/>
-              <a:t>màn</a:t>
-            </a:r>
-            <a:r>
-              <a:rPr lang="en-US" dirty="0" smtClean="0"/>
-              <a:t> </a:t>
-            </a:r>
-            <a:r>
-              <a:rPr lang="en-US" dirty="0" err="1" smtClean="0"/>
-              <a:t>hình</a:t>
-            </a:r>
-            <a:r>
-              <a:rPr lang="en-US" dirty="0" smtClean="0"/>
-              <a:t> )</a:t>
-            </a:r>
-            <a:endParaRPr lang="en-US" dirty="0"/>
-          </a:p>
-        </p:txBody>
-      </p:sp>
-      <p:sp>
-        <p:nvSpPr>
-          <p:cNvPr id="4" name="Footer Placeholder 3"/>
-          <p:cNvSpPr>
-            <a:spLocks noGrp="1"/>
-          </p:cNvSpPr>
-          <p:nvPr>
-            <p:ph type="ftr" sz="quarter" idx="11"/>
-          </p:nvPr>
-        </p:nvSpPr>
-        <p:spPr/>
-        <p:txBody>
-          <a:bodyPr/>
-          <a:lstStyle/>
-          <a:p>
-            <a:r>
-              <a:rPr lang="en-US" smtClean="0"/>
-              <a:t>Activestudy.edu.vn - Java Basic </a:t>
-            </a:r>
-            <a:endParaRPr lang="en-US"/>
-          </a:p>
-        </p:txBody>
-      </p:sp>
-    </p:spTree>
-    <p:extLst>
-      <p:ext uri="{BB962C8B-B14F-4D97-AF65-F5344CB8AC3E}">
-        <p14:creationId xmlns:p14="http://schemas.microsoft.com/office/powerpoint/2010/main" val="814921603"/>
-      </p:ext>
-    </p:extLst>
-  </p:cSld>
-  <p:clrMapOvr>
-    <a:masterClrMapping/>
-  </p:clrMapOvr>
-</p:sld>
-</file>
-
-<file path=ppt/slides/slide6.xml><?xml version="1.0" encoding="utf-8"?>
 <p:sld xmlns:a="http://schemas.openxmlformats.org/drawingml/2006/main" xmlns:r="http://schemas.openxmlformats.org/officeDocument/2006/relationships" xmlns:p="http://schemas.openxmlformats.org/presentationml/2006/main">
   <p:cSld>
     <p:spTree>
@@ -18004,7 +17453,7 @@
   <a:extraClrSchemeLst/>
   <a:extLst>
     <a:ext uri="{05A4C25C-085E-4340-85A3-A5531E510DB2}">
-      <thm15:themeFamily xmlns="" xmlns:thm15="http://schemas.microsoft.com/office/thememl/2012/main" name="Office Theme" id="{62F939B6-93AF-4DB8-9C6B-D6C7DFDC589F}" vid="{4A3C46E8-61CC-4603-A589-7422A47A8E4A}"/>
+      <thm15:themeFamily xmlns:thm15="http://schemas.microsoft.com/office/thememl/2012/main" xmlns="" name="Office Theme" id="{62F939B6-93AF-4DB8-9C6B-D6C7DFDC589F}" vid="{4A3C46E8-61CC-4603-A589-7422A47A8E4A}"/>
     </a:ext>
   </a:extLst>
 </a:theme>
@@ -18265,7 +17714,7 @@
   <a:extraClrSchemeLst/>
   <a:extLst>
     <a:ext uri="{05A4C25C-085E-4340-85A3-A5531E510DB2}">
-      <thm15:themeFamily xmlns="" xmlns:thm15="http://schemas.microsoft.com/office/thememl/2012/main" name="Office Theme" id="{62F939B6-93AF-4DB8-9C6B-D6C7DFDC589F}" vid="{4A3C46E8-61CC-4603-A589-7422A47A8E4A}"/>
+      <thm15:themeFamily xmlns:thm15="http://schemas.microsoft.com/office/thememl/2012/main" xmlns="" name="Office Theme" id="{62F939B6-93AF-4DB8-9C6B-D6C7DFDC589F}" vid="{4A3C46E8-61CC-4603-A589-7422A47A8E4A}"/>
     </a:ext>
   </a:extLst>
 </a:theme>

</xml_diff>